<commit_message>
added two files for ppt
</commit_message>
<xml_diff>
--- a/AI.pptx
+++ b/AI.pptx
@@ -256,7 +256,7 @@
           <a:p>
             <a:fld id="{8E3D44F6-5CF6-4E69-8072-15DAA78CD95F}" type="datetimeFigureOut">
               <a:rPr lang="en-IN" smtClean="0"/>
-              <a:t>19-03-2018</a:t>
+              <a:t>20-03-2018</a:t>
             </a:fld>
             <a:endParaRPr lang="en-IN"/>
           </a:p>
@@ -426,7 +426,7 @@
           <a:p>
             <a:fld id="{8E3D44F6-5CF6-4E69-8072-15DAA78CD95F}" type="datetimeFigureOut">
               <a:rPr lang="en-IN" smtClean="0"/>
-              <a:t>19-03-2018</a:t>
+              <a:t>20-03-2018</a:t>
             </a:fld>
             <a:endParaRPr lang="en-IN"/>
           </a:p>
@@ -606,7 +606,7 @@
           <a:p>
             <a:fld id="{8E3D44F6-5CF6-4E69-8072-15DAA78CD95F}" type="datetimeFigureOut">
               <a:rPr lang="en-IN" smtClean="0"/>
-              <a:t>19-03-2018</a:t>
+              <a:t>20-03-2018</a:t>
             </a:fld>
             <a:endParaRPr lang="en-IN"/>
           </a:p>
@@ -776,7 +776,7 @@
           <a:p>
             <a:fld id="{8E3D44F6-5CF6-4E69-8072-15DAA78CD95F}" type="datetimeFigureOut">
               <a:rPr lang="en-IN" smtClean="0"/>
-              <a:t>19-03-2018</a:t>
+              <a:t>20-03-2018</a:t>
             </a:fld>
             <a:endParaRPr lang="en-IN"/>
           </a:p>
@@ -1022,7 +1022,7 @@
           <a:p>
             <a:fld id="{8E3D44F6-5CF6-4E69-8072-15DAA78CD95F}" type="datetimeFigureOut">
               <a:rPr lang="en-IN" smtClean="0"/>
-              <a:t>19-03-2018</a:t>
+              <a:t>20-03-2018</a:t>
             </a:fld>
             <a:endParaRPr lang="en-IN"/>
           </a:p>
@@ -1254,7 +1254,7 @@
           <a:p>
             <a:fld id="{8E3D44F6-5CF6-4E69-8072-15DAA78CD95F}" type="datetimeFigureOut">
               <a:rPr lang="en-IN" smtClean="0"/>
-              <a:t>19-03-2018</a:t>
+              <a:t>20-03-2018</a:t>
             </a:fld>
             <a:endParaRPr lang="en-IN"/>
           </a:p>
@@ -1621,7 +1621,7 @@
           <a:p>
             <a:fld id="{8E3D44F6-5CF6-4E69-8072-15DAA78CD95F}" type="datetimeFigureOut">
               <a:rPr lang="en-IN" smtClean="0"/>
-              <a:t>19-03-2018</a:t>
+              <a:t>20-03-2018</a:t>
             </a:fld>
             <a:endParaRPr lang="en-IN"/>
           </a:p>
@@ -1739,7 +1739,7 @@
           <a:p>
             <a:fld id="{8E3D44F6-5CF6-4E69-8072-15DAA78CD95F}" type="datetimeFigureOut">
               <a:rPr lang="en-IN" smtClean="0"/>
-              <a:t>19-03-2018</a:t>
+              <a:t>20-03-2018</a:t>
             </a:fld>
             <a:endParaRPr lang="en-IN"/>
           </a:p>
@@ -1834,7 +1834,7 @@
           <a:p>
             <a:fld id="{8E3D44F6-5CF6-4E69-8072-15DAA78CD95F}" type="datetimeFigureOut">
               <a:rPr lang="en-IN" smtClean="0"/>
-              <a:t>19-03-2018</a:t>
+              <a:t>20-03-2018</a:t>
             </a:fld>
             <a:endParaRPr lang="en-IN"/>
           </a:p>
@@ -2111,7 +2111,7 @@
           <a:p>
             <a:fld id="{8E3D44F6-5CF6-4E69-8072-15DAA78CD95F}" type="datetimeFigureOut">
               <a:rPr lang="en-IN" smtClean="0"/>
-              <a:t>19-03-2018</a:t>
+              <a:t>20-03-2018</a:t>
             </a:fld>
             <a:endParaRPr lang="en-IN"/>
           </a:p>
@@ -2364,7 +2364,7 @@
           <a:p>
             <a:fld id="{8E3D44F6-5CF6-4E69-8072-15DAA78CD95F}" type="datetimeFigureOut">
               <a:rPr lang="en-IN" smtClean="0"/>
-              <a:t>19-03-2018</a:t>
+              <a:t>20-03-2018</a:t>
             </a:fld>
             <a:endParaRPr lang="en-IN"/>
           </a:p>
@@ -2577,7 +2577,7 @@
           <a:p>
             <a:fld id="{8E3D44F6-5CF6-4E69-8072-15DAA78CD95F}" type="datetimeFigureOut">
               <a:rPr lang="en-IN" smtClean="0"/>
-              <a:t>19-03-2018</a:t>
+              <a:t>20-03-2018</a:t>
             </a:fld>
             <a:endParaRPr lang="en-IN"/>
           </a:p>
@@ -4125,7 +4125,6 @@
               <a:rPr lang="en-IN" dirty="0" smtClean="0"/>
               <a:t>images.</a:t>
             </a:r>
-            <a:endParaRPr lang="en-IN" dirty="0" smtClean="0"/>
           </a:p>
           <a:p>
             <a:endParaRPr lang="en-IN" dirty="0"/>

</xml_diff>